<commit_message>
Modify Capa Display in Demo
</commit_message>
<xml_diff>
--- a/app/src/main/res/picfactory.pptx
+++ b/app/src/main/res/picfactory.pptx
@@ -7,6 +7,7 @@
   <p:sldIdLst>
     <p:sldId id="256" r:id="rId2"/>
     <p:sldId id="257" r:id="rId3"/>
+    <p:sldId id="258" r:id="rId4"/>
   </p:sldIdLst>
   <p:sldSz cx="5143500" cy="9144000" type="screen16x9"/>
   <p:notesSz cx="6858000" cy="9144000"/>
@@ -244,7 +245,7 @@
           <a:p>
             <a:fld id="{D63DE20D-5E8B-4167-A518-F53AFEE7C9FC}" type="datetimeFigureOut">
               <a:rPr lang="zh-CN" altLang="en-US" smtClean="0"/>
-              <a:t>2017/12/8</a:t>
+              <a:t>2018/6/6</a:t>
             </a:fld>
             <a:endParaRPr lang="zh-CN" altLang="en-US"/>
           </a:p>
@@ -414,7 +415,7 @@
           <a:p>
             <a:fld id="{D63DE20D-5E8B-4167-A518-F53AFEE7C9FC}" type="datetimeFigureOut">
               <a:rPr lang="zh-CN" altLang="en-US" smtClean="0"/>
-              <a:t>2017/12/8</a:t>
+              <a:t>2018/6/6</a:t>
             </a:fld>
             <a:endParaRPr lang="zh-CN" altLang="en-US"/>
           </a:p>
@@ -594,7 +595,7 @@
           <a:p>
             <a:fld id="{D63DE20D-5E8B-4167-A518-F53AFEE7C9FC}" type="datetimeFigureOut">
               <a:rPr lang="zh-CN" altLang="en-US" smtClean="0"/>
-              <a:t>2017/12/8</a:t>
+              <a:t>2018/6/6</a:t>
             </a:fld>
             <a:endParaRPr lang="zh-CN" altLang="en-US"/>
           </a:p>
@@ -764,7 +765,7 @@
           <a:p>
             <a:fld id="{D63DE20D-5E8B-4167-A518-F53AFEE7C9FC}" type="datetimeFigureOut">
               <a:rPr lang="zh-CN" altLang="en-US" smtClean="0"/>
-              <a:t>2017/12/8</a:t>
+              <a:t>2018/6/6</a:t>
             </a:fld>
             <a:endParaRPr lang="zh-CN" altLang="en-US"/>
           </a:p>
@@ -1008,7 +1009,7 @@
           <a:p>
             <a:fld id="{D63DE20D-5E8B-4167-A518-F53AFEE7C9FC}" type="datetimeFigureOut">
               <a:rPr lang="zh-CN" altLang="en-US" smtClean="0"/>
-              <a:t>2017/12/8</a:t>
+              <a:t>2018/6/6</a:t>
             </a:fld>
             <a:endParaRPr lang="zh-CN" altLang="en-US"/>
           </a:p>
@@ -1240,7 +1241,7 @@
           <a:p>
             <a:fld id="{D63DE20D-5E8B-4167-A518-F53AFEE7C9FC}" type="datetimeFigureOut">
               <a:rPr lang="zh-CN" altLang="en-US" smtClean="0"/>
-              <a:t>2017/12/8</a:t>
+              <a:t>2018/6/6</a:t>
             </a:fld>
             <a:endParaRPr lang="zh-CN" altLang="en-US"/>
           </a:p>
@@ -1607,7 +1608,7 @@
           <a:p>
             <a:fld id="{D63DE20D-5E8B-4167-A518-F53AFEE7C9FC}" type="datetimeFigureOut">
               <a:rPr lang="zh-CN" altLang="en-US" smtClean="0"/>
-              <a:t>2017/12/8</a:t>
+              <a:t>2018/6/6</a:t>
             </a:fld>
             <a:endParaRPr lang="zh-CN" altLang="en-US"/>
           </a:p>
@@ -1725,7 +1726,7 @@
           <a:p>
             <a:fld id="{D63DE20D-5E8B-4167-A518-F53AFEE7C9FC}" type="datetimeFigureOut">
               <a:rPr lang="zh-CN" altLang="en-US" smtClean="0"/>
-              <a:t>2017/12/8</a:t>
+              <a:t>2018/6/6</a:t>
             </a:fld>
             <a:endParaRPr lang="zh-CN" altLang="en-US"/>
           </a:p>
@@ -1820,7 +1821,7 @@
           <a:p>
             <a:fld id="{D63DE20D-5E8B-4167-A518-F53AFEE7C9FC}" type="datetimeFigureOut">
               <a:rPr lang="zh-CN" altLang="en-US" smtClean="0"/>
-              <a:t>2017/12/8</a:t>
+              <a:t>2018/6/6</a:t>
             </a:fld>
             <a:endParaRPr lang="zh-CN" altLang="en-US"/>
           </a:p>
@@ -2097,7 +2098,7 @@
           <a:p>
             <a:fld id="{D63DE20D-5E8B-4167-A518-F53AFEE7C9FC}" type="datetimeFigureOut">
               <a:rPr lang="zh-CN" altLang="en-US" smtClean="0"/>
-              <a:t>2017/12/8</a:t>
+              <a:t>2018/6/6</a:t>
             </a:fld>
             <a:endParaRPr lang="zh-CN" altLang="en-US"/>
           </a:p>
@@ -2354,7 +2355,7 @@
           <a:p>
             <a:fld id="{D63DE20D-5E8B-4167-A518-F53AFEE7C9FC}" type="datetimeFigureOut">
               <a:rPr lang="zh-CN" altLang="en-US" smtClean="0"/>
-              <a:t>2017/12/8</a:t>
+              <a:t>2018/6/6</a:t>
             </a:fld>
             <a:endParaRPr lang="zh-CN" altLang="en-US"/>
           </a:p>
@@ -2567,7 +2568,7 @@
           <a:p>
             <a:fld id="{D63DE20D-5E8B-4167-A518-F53AFEE7C9FC}" type="datetimeFigureOut">
               <a:rPr lang="zh-CN" altLang="en-US" smtClean="0"/>
-              <a:t>2017/12/8</a:t>
+              <a:t>2018/6/6</a:t>
             </a:fld>
             <a:endParaRPr lang="zh-CN" altLang="en-US"/>
           </a:p>
@@ -4395,6 +4396,1186 @@
 </p:sld>
 </file>
 
+<file path=ppt/slides/slide3.xml><?xml version="1.0" encoding="utf-8"?>
+<p:sld xmlns:a="http://schemas.openxmlformats.org/drawingml/2006/main" xmlns:r="http://schemas.openxmlformats.org/officeDocument/2006/relationships" xmlns:p="http://schemas.openxmlformats.org/presentationml/2006/main">
+  <p:cSld>
+    <p:spTree>
+      <p:nvGrpSpPr>
+        <p:cNvPr id="1" name=""/>
+        <p:cNvGrpSpPr/>
+        <p:nvPr/>
+      </p:nvGrpSpPr>
+      <p:grpSpPr>
+        <a:xfrm>
+          <a:off x="0" y="0"/>
+          <a:ext cx="0" cy="0"/>
+          <a:chOff x="0" y="0"/>
+          <a:chExt cx="0" cy="0"/>
+        </a:xfrm>
+      </p:grpSpPr>
+      <p:grpSp>
+        <p:nvGrpSpPr>
+          <p:cNvPr id="2" name="组合 1"/>
+          <p:cNvGrpSpPr/>
+          <p:nvPr/>
+        </p:nvGrpSpPr>
+        <p:grpSpPr>
+          <a:xfrm>
+            <a:off x="247238" y="457200"/>
+            <a:ext cx="4649024" cy="777240"/>
+            <a:chOff x="247238" y="457200"/>
+            <a:chExt cx="4649024" cy="777240"/>
+          </a:xfrm>
+        </p:grpSpPr>
+        <p:sp>
+          <p:nvSpPr>
+            <p:cNvPr id="10" name="圆角矩形 9"/>
+            <p:cNvSpPr/>
+            <p:nvPr/>
+          </p:nvSpPr>
+          <p:spPr>
+            <a:xfrm>
+              <a:off x="2183130" y="457200"/>
+              <a:ext cx="777240" cy="777240"/>
+            </a:xfrm>
+            <a:prstGeom prst="roundRect">
+              <a:avLst>
+                <a:gd name="adj" fmla="val 31421"/>
+              </a:avLst>
+            </a:prstGeom>
+            <a:ln w="28575"/>
+          </p:spPr>
+          <p:style>
+            <a:lnRef idx="2">
+              <a:schemeClr val="accent1">
+                <a:shade val="50000"/>
+              </a:schemeClr>
+            </a:lnRef>
+            <a:fillRef idx="1">
+              <a:schemeClr val="accent1"/>
+            </a:fillRef>
+            <a:effectRef idx="0">
+              <a:schemeClr val="accent1"/>
+            </a:effectRef>
+            <a:fontRef idx="minor">
+              <a:schemeClr val="lt1"/>
+            </a:fontRef>
+          </p:style>
+          <p:txBody>
+            <a:bodyPr rtlCol="0" anchor="ctr"/>
+            <a:lstStyle/>
+            <a:p>
+              <a:pPr algn="ctr"/>
+              <a:endParaRPr lang="en-US"/>
+            </a:p>
+          </p:txBody>
+        </p:sp>
+        <p:sp>
+          <p:nvSpPr>
+            <p:cNvPr id="35" name="圆角矩形 34"/>
+            <p:cNvSpPr/>
+            <p:nvPr/>
+          </p:nvSpPr>
+          <p:spPr>
+            <a:xfrm>
+              <a:off x="247238" y="457200"/>
+              <a:ext cx="777240" cy="777240"/>
+            </a:xfrm>
+            <a:prstGeom prst="roundRect">
+              <a:avLst>
+                <a:gd name="adj" fmla="val 31421"/>
+              </a:avLst>
+            </a:prstGeom>
+            <a:ln w="28575"/>
+          </p:spPr>
+          <p:style>
+            <a:lnRef idx="2">
+              <a:schemeClr val="accent1">
+                <a:shade val="50000"/>
+              </a:schemeClr>
+            </a:lnRef>
+            <a:fillRef idx="1">
+              <a:schemeClr val="accent1"/>
+            </a:fillRef>
+            <a:effectRef idx="0">
+              <a:schemeClr val="accent1"/>
+            </a:effectRef>
+            <a:fontRef idx="minor">
+              <a:schemeClr val="lt1"/>
+            </a:fontRef>
+          </p:style>
+          <p:txBody>
+            <a:bodyPr rtlCol="0" anchor="ctr"/>
+            <a:lstStyle/>
+            <a:p>
+              <a:pPr algn="ctr"/>
+              <a:endParaRPr lang="en-US"/>
+            </a:p>
+          </p:txBody>
+        </p:sp>
+        <p:sp>
+          <p:nvSpPr>
+            <p:cNvPr id="36" name="圆角矩形 35"/>
+            <p:cNvSpPr/>
+            <p:nvPr/>
+          </p:nvSpPr>
+          <p:spPr>
+            <a:xfrm>
+              <a:off x="1215184" y="457200"/>
+              <a:ext cx="777240" cy="777240"/>
+            </a:xfrm>
+            <a:prstGeom prst="roundRect">
+              <a:avLst>
+                <a:gd name="adj" fmla="val 31421"/>
+              </a:avLst>
+            </a:prstGeom>
+            <a:ln w="28575"/>
+          </p:spPr>
+          <p:style>
+            <a:lnRef idx="2">
+              <a:schemeClr val="accent1">
+                <a:shade val="50000"/>
+              </a:schemeClr>
+            </a:lnRef>
+            <a:fillRef idx="1">
+              <a:schemeClr val="accent1"/>
+            </a:fillRef>
+            <a:effectRef idx="0">
+              <a:schemeClr val="accent1"/>
+            </a:effectRef>
+            <a:fontRef idx="minor">
+              <a:schemeClr val="lt1"/>
+            </a:fontRef>
+          </p:style>
+          <p:txBody>
+            <a:bodyPr rtlCol="0" anchor="ctr"/>
+            <a:lstStyle/>
+            <a:p>
+              <a:pPr algn="ctr"/>
+              <a:endParaRPr lang="en-US"/>
+            </a:p>
+          </p:txBody>
+        </p:sp>
+        <p:sp>
+          <p:nvSpPr>
+            <p:cNvPr id="37" name="圆角矩形 36"/>
+            <p:cNvSpPr/>
+            <p:nvPr/>
+          </p:nvSpPr>
+          <p:spPr>
+            <a:xfrm>
+              <a:off x="3151076" y="457200"/>
+              <a:ext cx="777240" cy="777240"/>
+            </a:xfrm>
+            <a:prstGeom prst="roundRect">
+              <a:avLst>
+                <a:gd name="adj" fmla="val 31421"/>
+              </a:avLst>
+            </a:prstGeom>
+            <a:ln w="28575"/>
+          </p:spPr>
+          <p:style>
+            <a:lnRef idx="2">
+              <a:schemeClr val="accent1">
+                <a:shade val="50000"/>
+              </a:schemeClr>
+            </a:lnRef>
+            <a:fillRef idx="1">
+              <a:schemeClr val="accent1"/>
+            </a:fillRef>
+            <a:effectRef idx="0">
+              <a:schemeClr val="accent1"/>
+            </a:effectRef>
+            <a:fontRef idx="minor">
+              <a:schemeClr val="lt1"/>
+            </a:fontRef>
+          </p:style>
+          <p:txBody>
+            <a:bodyPr rtlCol="0" anchor="ctr"/>
+            <a:lstStyle/>
+            <a:p>
+              <a:pPr algn="ctr"/>
+              <a:endParaRPr lang="en-US"/>
+            </a:p>
+          </p:txBody>
+        </p:sp>
+        <p:sp>
+          <p:nvSpPr>
+            <p:cNvPr id="38" name="圆角矩形 37"/>
+            <p:cNvSpPr/>
+            <p:nvPr/>
+          </p:nvSpPr>
+          <p:spPr>
+            <a:xfrm>
+              <a:off x="4119022" y="457200"/>
+              <a:ext cx="777240" cy="777240"/>
+            </a:xfrm>
+            <a:prstGeom prst="roundRect">
+              <a:avLst>
+                <a:gd name="adj" fmla="val 31421"/>
+              </a:avLst>
+            </a:prstGeom>
+            <a:ln w="28575"/>
+          </p:spPr>
+          <p:style>
+            <a:lnRef idx="2">
+              <a:schemeClr val="accent1">
+                <a:shade val="50000"/>
+              </a:schemeClr>
+            </a:lnRef>
+            <a:fillRef idx="1">
+              <a:schemeClr val="accent1"/>
+            </a:fillRef>
+            <a:effectRef idx="0">
+              <a:schemeClr val="accent1"/>
+            </a:effectRef>
+            <a:fontRef idx="minor">
+              <a:schemeClr val="lt1"/>
+            </a:fontRef>
+          </p:style>
+          <p:txBody>
+            <a:bodyPr rtlCol="0" anchor="ctr"/>
+            <a:lstStyle/>
+            <a:p>
+              <a:pPr algn="ctr"/>
+              <a:endParaRPr lang="en-US"/>
+            </a:p>
+          </p:txBody>
+        </p:sp>
+      </p:grpSp>
+      <p:grpSp>
+        <p:nvGrpSpPr>
+          <p:cNvPr id="44" name="组合 43"/>
+          <p:cNvGrpSpPr/>
+          <p:nvPr/>
+        </p:nvGrpSpPr>
+        <p:grpSpPr>
+          <a:xfrm>
+            <a:off x="241986" y="2011680"/>
+            <a:ext cx="4649024" cy="777240"/>
+            <a:chOff x="247238" y="457200"/>
+            <a:chExt cx="4649024" cy="777240"/>
+          </a:xfrm>
+        </p:grpSpPr>
+        <p:sp>
+          <p:nvSpPr>
+            <p:cNvPr id="45" name="圆角矩形 44"/>
+            <p:cNvSpPr/>
+            <p:nvPr/>
+          </p:nvSpPr>
+          <p:spPr>
+            <a:xfrm>
+              <a:off x="2183130" y="457200"/>
+              <a:ext cx="777240" cy="777240"/>
+            </a:xfrm>
+            <a:prstGeom prst="roundRect">
+              <a:avLst>
+                <a:gd name="adj" fmla="val 31421"/>
+              </a:avLst>
+            </a:prstGeom>
+            <a:ln w="28575"/>
+          </p:spPr>
+          <p:style>
+            <a:lnRef idx="2">
+              <a:schemeClr val="accent1">
+                <a:shade val="50000"/>
+              </a:schemeClr>
+            </a:lnRef>
+            <a:fillRef idx="1">
+              <a:schemeClr val="accent1"/>
+            </a:fillRef>
+            <a:effectRef idx="0">
+              <a:schemeClr val="accent1"/>
+            </a:effectRef>
+            <a:fontRef idx="minor">
+              <a:schemeClr val="lt1"/>
+            </a:fontRef>
+          </p:style>
+          <p:txBody>
+            <a:bodyPr rtlCol="0" anchor="ctr"/>
+            <a:lstStyle/>
+            <a:p>
+              <a:pPr algn="ctr"/>
+              <a:endParaRPr lang="en-US"/>
+            </a:p>
+          </p:txBody>
+        </p:sp>
+        <p:sp>
+          <p:nvSpPr>
+            <p:cNvPr id="46" name="圆角矩形 45"/>
+            <p:cNvSpPr/>
+            <p:nvPr/>
+          </p:nvSpPr>
+          <p:spPr>
+            <a:xfrm>
+              <a:off x="247238" y="457200"/>
+              <a:ext cx="777240" cy="777240"/>
+            </a:xfrm>
+            <a:prstGeom prst="roundRect">
+              <a:avLst>
+                <a:gd name="adj" fmla="val 31421"/>
+              </a:avLst>
+            </a:prstGeom>
+            <a:ln w="28575"/>
+          </p:spPr>
+          <p:style>
+            <a:lnRef idx="2">
+              <a:schemeClr val="accent1">
+                <a:shade val="50000"/>
+              </a:schemeClr>
+            </a:lnRef>
+            <a:fillRef idx="1">
+              <a:schemeClr val="accent1"/>
+            </a:fillRef>
+            <a:effectRef idx="0">
+              <a:schemeClr val="accent1"/>
+            </a:effectRef>
+            <a:fontRef idx="minor">
+              <a:schemeClr val="lt1"/>
+            </a:fontRef>
+          </p:style>
+          <p:txBody>
+            <a:bodyPr rtlCol="0" anchor="ctr"/>
+            <a:lstStyle/>
+            <a:p>
+              <a:pPr algn="ctr"/>
+              <a:endParaRPr lang="en-US"/>
+            </a:p>
+          </p:txBody>
+        </p:sp>
+        <p:sp>
+          <p:nvSpPr>
+            <p:cNvPr id="47" name="圆角矩形 46"/>
+            <p:cNvSpPr/>
+            <p:nvPr/>
+          </p:nvSpPr>
+          <p:spPr>
+            <a:xfrm>
+              <a:off x="1215184" y="457200"/>
+              <a:ext cx="777240" cy="777240"/>
+            </a:xfrm>
+            <a:prstGeom prst="roundRect">
+              <a:avLst>
+                <a:gd name="adj" fmla="val 31421"/>
+              </a:avLst>
+            </a:prstGeom>
+            <a:ln w="28575"/>
+          </p:spPr>
+          <p:style>
+            <a:lnRef idx="2">
+              <a:schemeClr val="accent1">
+                <a:shade val="50000"/>
+              </a:schemeClr>
+            </a:lnRef>
+            <a:fillRef idx="1">
+              <a:schemeClr val="accent1"/>
+            </a:fillRef>
+            <a:effectRef idx="0">
+              <a:schemeClr val="accent1"/>
+            </a:effectRef>
+            <a:fontRef idx="minor">
+              <a:schemeClr val="lt1"/>
+            </a:fontRef>
+          </p:style>
+          <p:txBody>
+            <a:bodyPr rtlCol="0" anchor="ctr"/>
+            <a:lstStyle/>
+            <a:p>
+              <a:pPr algn="ctr"/>
+              <a:endParaRPr lang="en-US"/>
+            </a:p>
+          </p:txBody>
+        </p:sp>
+        <p:sp>
+          <p:nvSpPr>
+            <p:cNvPr id="48" name="圆角矩形 47"/>
+            <p:cNvSpPr/>
+            <p:nvPr/>
+          </p:nvSpPr>
+          <p:spPr>
+            <a:xfrm>
+              <a:off x="3151076" y="457200"/>
+              <a:ext cx="777240" cy="777240"/>
+            </a:xfrm>
+            <a:prstGeom prst="roundRect">
+              <a:avLst>
+                <a:gd name="adj" fmla="val 31421"/>
+              </a:avLst>
+            </a:prstGeom>
+            <a:ln w="28575"/>
+          </p:spPr>
+          <p:style>
+            <a:lnRef idx="2">
+              <a:schemeClr val="accent1">
+                <a:shade val="50000"/>
+              </a:schemeClr>
+            </a:lnRef>
+            <a:fillRef idx="1">
+              <a:schemeClr val="accent1"/>
+            </a:fillRef>
+            <a:effectRef idx="0">
+              <a:schemeClr val="accent1"/>
+            </a:effectRef>
+            <a:fontRef idx="minor">
+              <a:schemeClr val="lt1"/>
+            </a:fontRef>
+          </p:style>
+          <p:txBody>
+            <a:bodyPr rtlCol="0" anchor="ctr"/>
+            <a:lstStyle/>
+            <a:p>
+              <a:pPr algn="ctr"/>
+              <a:endParaRPr lang="en-US"/>
+            </a:p>
+          </p:txBody>
+        </p:sp>
+        <p:sp>
+          <p:nvSpPr>
+            <p:cNvPr id="49" name="圆角矩形 48"/>
+            <p:cNvSpPr/>
+            <p:nvPr/>
+          </p:nvSpPr>
+          <p:spPr>
+            <a:xfrm>
+              <a:off x="4119022" y="457200"/>
+              <a:ext cx="777240" cy="777240"/>
+            </a:xfrm>
+            <a:prstGeom prst="roundRect">
+              <a:avLst>
+                <a:gd name="adj" fmla="val 31421"/>
+              </a:avLst>
+            </a:prstGeom>
+            <a:ln w="28575"/>
+          </p:spPr>
+          <p:style>
+            <a:lnRef idx="2">
+              <a:schemeClr val="accent1">
+                <a:shade val="50000"/>
+              </a:schemeClr>
+            </a:lnRef>
+            <a:fillRef idx="1">
+              <a:schemeClr val="accent1"/>
+            </a:fillRef>
+            <a:effectRef idx="0">
+              <a:schemeClr val="accent1"/>
+            </a:effectRef>
+            <a:fontRef idx="minor">
+              <a:schemeClr val="lt1"/>
+            </a:fontRef>
+          </p:style>
+          <p:txBody>
+            <a:bodyPr rtlCol="0" anchor="ctr"/>
+            <a:lstStyle/>
+            <a:p>
+              <a:pPr algn="ctr"/>
+              <a:endParaRPr lang="en-US"/>
+            </a:p>
+          </p:txBody>
+        </p:sp>
+      </p:grpSp>
+      <p:grpSp>
+        <p:nvGrpSpPr>
+          <p:cNvPr id="50" name="组合 49"/>
+          <p:cNvGrpSpPr/>
+          <p:nvPr/>
+        </p:nvGrpSpPr>
+        <p:grpSpPr>
+          <a:xfrm>
+            <a:off x="241986" y="3566160"/>
+            <a:ext cx="4649024" cy="777240"/>
+            <a:chOff x="247238" y="457200"/>
+            <a:chExt cx="4649024" cy="777240"/>
+          </a:xfrm>
+        </p:grpSpPr>
+        <p:sp>
+          <p:nvSpPr>
+            <p:cNvPr id="51" name="圆角矩形 50"/>
+            <p:cNvSpPr/>
+            <p:nvPr/>
+          </p:nvSpPr>
+          <p:spPr>
+            <a:xfrm>
+              <a:off x="2183130" y="457200"/>
+              <a:ext cx="777240" cy="777240"/>
+            </a:xfrm>
+            <a:prstGeom prst="roundRect">
+              <a:avLst>
+                <a:gd name="adj" fmla="val 31421"/>
+              </a:avLst>
+            </a:prstGeom>
+            <a:ln w="28575"/>
+          </p:spPr>
+          <p:style>
+            <a:lnRef idx="2">
+              <a:schemeClr val="accent1">
+                <a:shade val="50000"/>
+              </a:schemeClr>
+            </a:lnRef>
+            <a:fillRef idx="1">
+              <a:schemeClr val="accent1"/>
+            </a:fillRef>
+            <a:effectRef idx="0">
+              <a:schemeClr val="accent1"/>
+            </a:effectRef>
+            <a:fontRef idx="minor">
+              <a:schemeClr val="lt1"/>
+            </a:fontRef>
+          </p:style>
+          <p:txBody>
+            <a:bodyPr rtlCol="0" anchor="ctr"/>
+            <a:lstStyle/>
+            <a:p>
+              <a:pPr algn="ctr"/>
+              <a:endParaRPr lang="en-US"/>
+            </a:p>
+          </p:txBody>
+        </p:sp>
+        <p:sp>
+          <p:nvSpPr>
+            <p:cNvPr id="52" name="圆角矩形 51"/>
+            <p:cNvSpPr/>
+            <p:nvPr/>
+          </p:nvSpPr>
+          <p:spPr>
+            <a:xfrm>
+              <a:off x="247238" y="457200"/>
+              <a:ext cx="777240" cy="777240"/>
+            </a:xfrm>
+            <a:prstGeom prst="roundRect">
+              <a:avLst>
+                <a:gd name="adj" fmla="val 31421"/>
+              </a:avLst>
+            </a:prstGeom>
+            <a:ln w="28575"/>
+          </p:spPr>
+          <p:style>
+            <a:lnRef idx="2">
+              <a:schemeClr val="accent1">
+                <a:shade val="50000"/>
+              </a:schemeClr>
+            </a:lnRef>
+            <a:fillRef idx="1">
+              <a:schemeClr val="accent1"/>
+            </a:fillRef>
+            <a:effectRef idx="0">
+              <a:schemeClr val="accent1"/>
+            </a:effectRef>
+            <a:fontRef idx="minor">
+              <a:schemeClr val="lt1"/>
+            </a:fontRef>
+          </p:style>
+          <p:txBody>
+            <a:bodyPr rtlCol="0" anchor="ctr"/>
+            <a:lstStyle/>
+            <a:p>
+              <a:pPr algn="ctr"/>
+              <a:endParaRPr lang="en-US"/>
+            </a:p>
+          </p:txBody>
+        </p:sp>
+        <p:sp>
+          <p:nvSpPr>
+            <p:cNvPr id="53" name="圆角矩形 52"/>
+            <p:cNvSpPr/>
+            <p:nvPr/>
+          </p:nvSpPr>
+          <p:spPr>
+            <a:xfrm>
+              <a:off x="1215184" y="457200"/>
+              <a:ext cx="777240" cy="777240"/>
+            </a:xfrm>
+            <a:prstGeom prst="roundRect">
+              <a:avLst>
+                <a:gd name="adj" fmla="val 31421"/>
+              </a:avLst>
+            </a:prstGeom>
+            <a:ln w="28575"/>
+          </p:spPr>
+          <p:style>
+            <a:lnRef idx="2">
+              <a:schemeClr val="accent1">
+                <a:shade val="50000"/>
+              </a:schemeClr>
+            </a:lnRef>
+            <a:fillRef idx="1">
+              <a:schemeClr val="accent1"/>
+            </a:fillRef>
+            <a:effectRef idx="0">
+              <a:schemeClr val="accent1"/>
+            </a:effectRef>
+            <a:fontRef idx="minor">
+              <a:schemeClr val="lt1"/>
+            </a:fontRef>
+          </p:style>
+          <p:txBody>
+            <a:bodyPr rtlCol="0" anchor="ctr"/>
+            <a:lstStyle/>
+            <a:p>
+              <a:pPr algn="ctr"/>
+              <a:endParaRPr lang="en-US"/>
+            </a:p>
+          </p:txBody>
+        </p:sp>
+        <p:sp>
+          <p:nvSpPr>
+            <p:cNvPr id="54" name="圆角矩形 53"/>
+            <p:cNvSpPr/>
+            <p:nvPr/>
+          </p:nvSpPr>
+          <p:spPr>
+            <a:xfrm>
+              <a:off x="3151076" y="457200"/>
+              <a:ext cx="777240" cy="777240"/>
+            </a:xfrm>
+            <a:prstGeom prst="roundRect">
+              <a:avLst>
+                <a:gd name="adj" fmla="val 31421"/>
+              </a:avLst>
+            </a:prstGeom>
+            <a:ln w="28575"/>
+          </p:spPr>
+          <p:style>
+            <a:lnRef idx="2">
+              <a:schemeClr val="accent1">
+                <a:shade val="50000"/>
+              </a:schemeClr>
+            </a:lnRef>
+            <a:fillRef idx="1">
+              <a:schemeClr val="accent1"/>
+            </a:fillRef>
+            <a:effectRef idx="0">
+              <a:schemeClr val="accent1"/>
+            </a:effectRef>
+            <a:fontRef idx="minor">
+              <a:schemeClr val="lt1"/>
+            </a:fontRef>
+          </p:style>
+          <p:txBody>
+            <a:bodyPr rtlCol="0" anchor="ctr"/>
+            <a:lstStyle/>
+            <a:p>
+              <a:pPr algn="ctr"/>
+              <a:endParaRPr lang="en-US"/>
+            </a:p>
+          </p:txBody>
+        </p:sp>
+        <p:sp>
+          <p:nvSpPr>
+            <p:cNvPr id="55" name="圆角矩形 54"/>
+            <p:cNvSpPr/>
+            <p:nvPr/>
+          </p:nvSpPr>
+          <p:spPr>
+            <a:xfrm>
+              <a:off x="4119022" y="457200"/>
+              <a:ext cx="777240" cy="777240"/>
+            </a:xfrm>
+            <a:prstGeom prst="roundRect">
+              <a:avLst>
+                <a:gd name="adj" fmla="val 31421"/>
+              </a:avLst>
+            </a:prstGeom>
+            <a:ln w="28575"/>
+          </p:spPr>
+          <p:style>
+            <a:lnRef idx="2">
+              <a:schemeClr val="accent1">
+                <a:shade val="50000"/>
+              </a:schemeClr>
+            </a:lnRef>
+            <a:fillRef idx="1">
+              <a:schemeClr val="accent1"/>
+            </a:fillRef>
+            <a:effectRef idx="0">
+              <a:schemeClr val="accent1"/>
+            </a:effectRef>
+            <a:fontRef idx="minor">
+              <a:schemeClr val="lt1"/>
+            </a:fontRef>
+          </p:style>
+          <p:txBody>
+            <a:bodyPr rtlCol="0" anchor="ctr"/>
+            <a:lstStyle/>
+            <a:p>
+              <a:pPr algn="ctr"/>
+              <a:endParaRPr lang="en-US"/>
+            </a:p>
+          </p:txBody>
+        </p:sp>
+      </p:grpSp>
+      <p:grpSp>
+        <p:nvGrpSpPr>
+          <p:cNvPr id="56" name="组合 55"/>
+          <p:cNvGrpSpPr/>
+          <p:nvPr/>
+        </p:nvGrpSpPr>
+        <p:grpSpPr>
+          <a:xfrm>
+            <a:off x="241986" y="5120640"/>
+            <a:ext cx="4649024" cy="777240"/>
+            <a:chOff x="247238" y="457200"/>
+            <a:chExt cx="4649024" cy="777240"/>
+          </a:xfrm>
+        </p:grpSpPr>
+        <p:sp>
+          <p:nvSpPr>
+            <p:cNvPr id="57" name="圆角矩形 56"/>
+            <p:cNvSpPr/>
+            <p:nvPr/>
+          </p:nvSpPr>
+          <p:spPr>
+            <a:xfrm>
+              <a:off x="2183130" y="457200"/>
+              <a:ext cx="777240" cy="777240"/>
+            </a:xfrm>
+            <a:prstGeom prst="roundRect">
+              <a:avLst>
+                <a:gd name="adj" fmla="val 31421"/>
+              </a:avLst>
+            </a:prstGeom>
+            <a:ln w="28575"/>
+          </p:spPr>
+          <p:style>
+            <a:lnRef idx="2">
+              <a:schemeClr val="accent1">
+                <a:shade val="50000"/>
+              </a:schemeClr>
+            </a:lnRef>
+            <a:fillRef idx="1">
+              <a:schemeClr val="accent1"/>
+            </a:fillRef>
+            <a:effectRef idx="0">
+              <a:schemeClr val="accent1"/>
+            </a:effectRef>
+            <a:fontRef idx="minor">
+              <a:schemeClr val="lt1"/>
+            </a:fontRef>
+          </p:style>
+          <p:txBody>
+            <a:bodyPr rtlCol="0" anchor="ctr"/>
+            <a:lstStyle/>
+            <a:p>
+              <a:pPr algn="ctr"/>
+              <a:endParaRPr lang="en-US"/>
+            </a:p>
+          </p:txBody>
+        </p:sp>
+        <p:sp>
+          <p:nvSpPr>
+            <p:cNvPr id="58" name="圆角矩形 57"/>
+            <p:cNvSpPr/>
+            <p:nvPr/>
+          </p:nvSpPr>
+          <p:spPr>
+            <a:xfrm>
+              <a:off x="247238" y="457200"/>
+              <a:ext cx="777240" cy="777240"/>
+            </a:xfrm>
+            <a:prstGeom prst="roundRect">
+              <a:avLst>
+                <a:gd name="adj" fmla="val 31421"/>
+              </a:avLst>
+            </a:prstGeom>
+            <a:ln w="28575"/>
+          </p:spPr>
+          <p:style>
+            <a:lnRef idx="2">
+              <a:schemeClr val="accent1">
+                <a:shade val="50000"/>
+              </a:schemeClr>
+            </a:lnRef>
+            <a:fillRef idx="1">
+              <a:schemeClr val="accent1"/>
+            </a:fillRef>
+            <a:effectRef idx="0">
+              <a:schemeClr val="accent1"/>
+            </a:effectRef>
+            <a:fontRef idx="minor">
+              <a:schemeClr val="lt1"/>
+            </a:fontRef>
+          </p:style>
+          <p:txBody>
+            <a:bodyPr rtlCol="0" anchor="ctr"/>
+            <a:lstStyle/>
+            <a:p>
+              <a:pPr algn="ctr"/>
+              <a:endParaRPr lang="en-US"/>
+            </a:p>
+          </p:txBody>
+        </p:sp>
+        <p:sp>
+          <p:nvSpPr>
+            <p:cNvPr id="59" name="圆角矩形 58"/>
+            <p:cNvSpPr/>
+            <p:nvPr/>
+          </p:nvSpPr>
+          <p:spPr>
+            <a:xfrm>
+              <a:off x="1215184" y="457200"/>
+              <a:ext cx="777240" cy="777240"/>
+            </a:xfrm>
+            <a:prstGeom prst="roundRect">
+              <a:avLst>
+                <a:gd name="adj" fmla="val 31421"/>
+              </a:avLst>
+            </a:prstGeom>
+            <a:ln w="28575"/>
+          </p:spPr>
+          <p:style>
+            <a:lnRef idx="2">
+              <a:schemeClr val="accent1">
+                <a:shade val="50000"/>
+              </a:schemeClr>
+            </a:lnRef>
+            <a:fillRef idx="1">
+              <a:schemeClr val="accent1"/>
+            </a:fillRef>
+            <a:effectRef idx="0">
+              <a:schemeClr val="accent1"/>
+            </a:effectRef>
+            <a:fontRef idx="minor">
+              <a:schemeClr val="lt1"/>
+            </a:fontRef>
+          </p:style>
+          <p:txBody>
+            <a:bodyPr rtlCol="0" anchor="ctr"/>
+            <a:lstStyle/>
+            <a:p>
+              <a:pPr algn="ctr"/>
+              <a:endParaRPr lang="en-US"/>
+            </a:p>
+          </p:txBody>
+        </p:sp>
+        <p:sp>
+          <p:nvSpPr>
+            <p:cNvPr id="60" name="圆角矩形 59"/>
+            <p:cNvSpPr/>
+            <p:nvPr/>
+          </p:nvSpPr>
+          <p:spPr>
+            <a:xfrm>
+              <a:off x="3151076" y="457200"/>
+              <a:ext cx="777240" cy="777240"/>
+            </a:xfrm>
+            <a:prstGeom prst="roundRect">
+              <a:avLst>
+                <a:gd name="adj" fmla="val 31421"/>
+              </a:avLst>
+            </a:prstGeom>
+            <a:ln w="28575"/>
+          </p:spPr>
+          <p:style>
+            <a:lnRef idx="2">
+              <a:schemeClr val="accent1">
+                <a:shade val="50000"/>
+              </a:schemeClr>
+            </a:lnRef>
+            <a:fillRef idx="1">
+              <a:schemeClr val="accent1"/>
+            </a:fillRef>
+            <a:effectRef idx="0">
+              <a:schemeClr val="accent1"/>
+            </a:effectRef>
+            <a:fontRef idx="minor">
+              <a:schemeClr val="lt1"/>
+            </a:fontRef>
+          </p:style>
+          <p:txBody>
+            <a:bodyPr rtlCol="0" anchor="ctr"/>
+            <a:lstStyle/>
+            <a:p>
+              <a:pPr algn="ctr"/>
+              <a:endParaRPr lang="en-US"/>
+            </a:p>
+          </p:txBody>
+        </p:sp>
+        <p:sp>
+          <p:nvSpPr>
+            <p:cNvPr id="61" name="圆角矩形 60"/>
+            <p:cNvSpPr/>
+            <p:nvPr/>
+          </p:nvSpPr>
+          <p:spPr>
+            <a:xfrm>
+              <a:off x="4119022" y="457200"/>
+              <a:ext cx="777240" cy="777240"/>
+            </a:xfrm>
+            <a:prstGeom prst="roundRect">
+              <a:avLst>
+                <a:gd name="adj" fmla="val 31421"/>
+              </a:avLst>
+            </a:prstGeom>
+            <a:ln w="28575"/>
+          </p:spPr>
+          <p:style>
+            <a:lnRef idx="2">
+              <a:schemeClr val="accent1">
+                <a:shade val="50000"/>
+              </a:schemeClr>
+            </a:lnRef>
+            <a:fillRef idx="1">
+              <a:schemeClr val="accent1"/>
+            </a:fillRef>
+            <a:effectRef idx="0">
+              <a:schemeClr val="accent1"/>
+            </a:effectRef>
+            <a:fontRef idx="minor">
+              <a:schemeClr val="lt1"/>
+            </a:fontRef>
+          </p:style>
+          <p:txBody>
+            <a:bodyPr rtlCol="0" anchor="ctr"/>
+            <a:lstStyle/>
+            <a:p>
+              <a:pPr algn="ctr"/>
+              <a:endParaRPr lang="en-US"/>
+            </a:p>
+          </p:txBody>
+        </p:sp>
+      </p:grpSp>
+      <p:grpSp>
+        <p:nvGrpSpPr>
+          <p:cNvPr id="62" name="组合 61"/>
+          <p:cNvGrpSpPr/>
+          <p:nvPr/>
+        </p:nvGrpSpPr>
+        <p:grpSpPr>
+          <a:xfrm>
+            <a:off x="241986" y="6583680"/>
+            <a:ext cx="4649024" cy="777240"/>
+            <a:chOff x="247238" y="457200"/>
+            <a:chExt cx="4649024" cy="777240"/>
+          </a:xfrm>
+        </p:grpSpPr>
+        <p:sp>
+          <p:nvSpPr>
+            <p:cNvPr id="63" name="圆角矩形 62"/>
+            <p:cNvSpPr/>
+            <p:nvPr/>
+          </p:nvSpPr>
+          <p:spPr>
+            <a:xfrm>
+              <a:off x="2183130" y="457200"/>
+              <a:ext cx="777240" cy="777240"/>
+            </a:xfrm>
+            <a:prstGeom prst="roundRect">
+              <a:avLst>
+                <a:gd name="adj" fmla="val 31421"/>
+              </a:avLst>
+            </a:prstGeom>
+            <a:ln w="28575"/>
+          </p:spPr>
+          <p:style>
+            <a:lnRef idx="2">
+              <a:schemeClr val="accent1">
+                <a:shade val="50000"/>
+              </a:schemeClr>
+            </a:lnRef>
+            <a:fillRef idx="1">
+              <a:schemeClr val="accent1"/>
+            </a:fillRef>
+            <a:effectRef idx="0">
+              <a:schemeClr val="accent1"/>
+            </a:effectRef>
+            <a:fontRef idx="minor">
+              <a:schemeClr val="lt1"/>
+            </a:fontRef>
+          </p:style>
+          <p:txBody>
+            <a:bodyPr rtlCol="0" anchor="ctr"/>
+            <a:lstStyle/>
+            <a:p>
+              <a:pPr algn="ctr"/>
+              <a:endParaRPr lang="en-US"/>
+            </a:p>
+          </p:txBody>
+        </p:sp>
+        <p:sp>
+          <p:nvSpPr>
+            <p:cNvPr id="64" name="圆角矩形 63"/>
+            <p:cNvSpPr/>
+            <p:nvPr/>
+          </p:nvSpPr>
+          <p:spPr>
+            <a:xfrm>
+              <a:off x="247238" y="457200"/>
+              <a:ext cx="777240" cy="777240"/>
+            </a:xfrm>
+            <a:prstGeom prst="roundRect">
+              <a:avLst>
+                <a:gd name="adj" fmla="val 31421"/>
+              </a:avLst>
+            </a:prstGeom>
+            <a:ln w="28575"/>
+          </p:spPr>
+          <p:style>
+            <a:lnRef idx="2">
+              <a:schemeClr val="accent1">
+                <a:shade val="50000"/>
+              </a:schemeClr>
+            </a:lnRef>
+            <a:fillRef idx="1">
+              <a:schemeClr val="accent1"/>
+            </a:fillRef>
+            <a:effectRef idx="0">
+              <a:schemeClr val="accent1"/>
+            </a:effectRef>
+            <a:fontRef idx="minor">
+              <a:schemeClr val="lt1"/>
+            </a:fontRef>
+          </p:style>
+          <p:txBody>
+            <a:bodyPr rtlCol="0" anchor="ctr"/>
+            <a:lstStyle/>
+            <a:p>
+              <a:pPr algn="ctr"/>
+              <a:endParaRPr lang="en-US"/>
+            </a:p>
+          </p:txBody>
+        </p:sp>
+        <p:sp>
+          <p:nvSpPr>
+            <p:cNvPr id="65" name="圆角矩形 64"/>
+            <p:cNvSpPr/>
+            <p:nvPr/>
+          </p:nvSpPr>
+          <p:spPr>
+            <a:xfrm>
+              <a:off x="1215184" y="457200"/>
+              <a:ext cx="777240" cy="777240"/>
+            </a:xfrm>
+            <a:prstGeom prst="roundRect">
+              <a:avLst>
+                <a:gd name="adj" fmla="val 31421"/>
+              </a:avLst>
+            </a:prstGeom>
+            <a:ln w="28575"/>
+          </p:spPr>
+          <p:style>
+            <a:lnRef idx="2">
+              <a:schemeClr val="accent1">
+                <a:shade val="50000"/>
+              </a:schemeClr>
+            </a:lnRef>
+            <a:fillRef idx="1">
+              <a:schemeClr val="accent1"/>
+            </a:fillRef>
+            <a:effectRef idx="0">
+              <a:schemeClr val="accent1"/>
+            </a:effectRef>
+            <a:fontRef idx="minor">
+              <a:schemeClr val="lt1"/>
+            </a:fontRef>
+          </p:style>
+          <p:txBody>
+            <a:bodyPr rtlCol="0" anchor="ctr"/>
+            <a:lstStyle/>
+            <a:p>
+              <a:pPr algn="ctr"/>
+              <a:endParaRPr lang="en-US"/>
+            </a:p>
+          </p:txBody>
+        </p:sp>
+        <p:sp>
+          <p:nvSpPr>
+            <p:cNvPr id="66" name="圆角矩形 65"/>
+            <p:cNvSpPr/>
+            <p:nvPr/>
+          </p:nvSpPr>
+          <p:spPr>
+            <a:xfrm>
+              <a:off x="3151076" y="457200"/>
+              <a:ext cx="777240" cy="777240"/>
+            </a:xfrm>
+            <a:prstGeom prst="roundRect">
+              <a:avLst>
+                <a:gd name="adj" fmla="val 31421"/>
+              </a:avLst>
+            </a:prstGeom>
+            <a:ln w="28575"/>
+          </p:spPr>
+          <p:style>
+            <a:lnRef idx="2">
+              <a:schemeClr val="accent1">
+                <a:shade val="50000"/>
+              </a:schemeClr>
+            </a:lnRef>
+            <a:fillRef idx="1">
+              <a:schemeClr val="accent1"/>
+            </a:fillRef>
+            <a:effectRef idx="0">
+              <a:schemeClr val="accent1"/>
+            </a:effectRef>
+            <a:fontRef idx="minor">
+              <a:schemeClr val="lt1"/>
+            </a:fontRef>
+          </p:style>
+          <p:txBody>
+            <a:bodyPr rtlCol="0" anchor="ctr"/>
+            <a:lstStyle/>
+            <a:p>
+              <a:pPr algn="ctr"/>
+              <a:endParaRPr lang="en-US"/>
+            </a:p>
+          </p:txBody>
+        </p:sp>
+        <p:sp>
+          <p:nvSpPr>
+            <p:cNvPr id="67" name="圆角矩形 66"/>
+            <p:cNvSpPr/>
+            <p:nvPr/>
+          </p:nvSpPr>
+          <p:spPr>
+            <a:xfrm>
+              <a:off x="4119022" y="457200"/>
+              <a:ext cx="777240" cy="777240"/>
+            </a:xfrm>
+            <a:prstGeom prst="roundRect">
+              <a:avLst>
+                <a:gd name="adj" fmla="val 31421"/>
+              </a:avLst>
+            </a:prstGeom>
+            <a:ln w="28575"/>
+          </p:spPr>
+          <p:style>
+            <a:lnRef idx="2">
+              <a:schemeClr val="accent1">
+                <a:shade val="50000"/>
+              </a:schemeClr>
+            </a:lnRef>
+            <a:fillRef idx="1">
+              <a:schemeClr val="accent1"/>
+            </a:fillRef>
+            <a:effectRef idx="0">
+              <a:schemeClr val="accent1"/>
+            </a:effectRef>
+            <a:fontRef idx="minor">
+              <a:schemeClr val="lt1"/>
+            </a:fontRef>
+          </p:style>
+          <p:txBody>
+            <a:bodyPr rtlCol="0" anchor="ctr"/>
+            <a:lstStyle/>
+            <a:p>
+              <a:pPr algn="ctr"/>
+              <a:endParaRPr lang="en-US"/>
+            </a:p>
+          </p:txBody>
+        </p:sp>
+      </p:grpSp>
+    </p:spTree>
+    <p:extLst>
+      <p:ext uri="{BB962C8B-B14F-4D97-AF65-F5344CB8AC3E}">
+        <p14:creationId xmlns:p14="http://schemas.microsoft.com/office/powerpoint/2010/main" val="223379951"/>
+      </p:ext>
+    </p:extLst>
+  </p:cSld>
+  <p:clrMapOvr>
+    <a:masterClrMapping/>
+  </p:clrMapOvr>
+</p:sld>
+</file>
+
 <file path=ppt/theme/theme1.xml><?xml version="1.0" encoding="utf-8"?>
 <a:theme xmlns:a="http://schemas.openxmlformats.org/drawingml/2006/main" name="Office 主题">
   <a:themeElements>

</xml_diff>